<commit_message>
Added Zip file and added links in ppt
</commit_message>
<xml_diff>
--- a/deliverables/HP ML Hackthon PPT.pptx
+++ b/deliverables/HP ML Hackthon PPT.pptx
@@ -8163,6 +8163,71 @@
           </a:prstGeom>
         </p:spPr>
       </p:pic>
+      <p:sp>
+        <p:nvSpPr>
+          <p:cNvPr id="2" name="TextBox 1">
+            <a:extLst>
+              <a:ext uri="{FF2B5EF4-FFF2-40B4-BE49-F238E27FC236}">
+                <a16:creationId xmlns:a16="http://schemas.microsoft.com/office/drawing/2014/main" id="{A8A32DDD-7D73-A864-BAD4-9D7836F3CAC9}"/>
+              </a:ext>
+            </a:extLst>
+          </p:cNvPr>
+          <p:cNvSpPr txBox="1"/>
+          <p:nvPr/>
+        </p:nvSpPr>
+        <p:spPr>
+          <a:xfrm>
+            <a:off x="357158" y="2132856"/>
+            <a:ext cx="8391306" cy="1754326"/>
+          </a:xfrm>
+          <a:prstGeom prst="rect">
+            <a:avLst/>
+          </a:prstGeom>
+          <a:noFill/>
+        </p:spPr>
+        <p:txBody>
+          <a:bodyPr wrap="square" rtlCol="0">
+            <a:spAutoFit/>
+          </a:bodyPr>
+          <a:lstStyle/>
+          <a:p>
+            <a:r>
+              <a:rPr lang="en-IN" b="1" dirty="0"/>
+              <a:t>GITHUB</a:t>
+            </a:r>
+            <a:r>
+              <a:rPr lang="en-IN" dirty="0"/>
+              <a:t>: </a:t>
+            </a:r>
+            <a:r>
+              <a:rPr lang="en-IN" dirty="0">
+                <a:hlinkClick r:id="rId3"/>
+              </a:rPr>
+              <a:t>https://github.com/shreyasvedpathak/Shreyas-Vedpathak-HP-ML-Hackathon</a:t>
+            </a:r>
+            <a:endParaRPr lang="en-IN" dirty="0"/>
+          </a:p>
+          <a:p>
+            <a:endParaRPr lang="en-IN" b="1" dirty="0"/>
+          </a:p>
+          <a:p>
+            <a:r>
+              <a:rPr lang="en-IN" b="1" dirty="0"/>
+              <a:t>ZIP GOOGLE DRIVE: </a:t>
+            </a:r>
+            <a:r>
+              <a:rPr lang="en-IN" dirty="0">
+                <a:hlinkClick r:id="rId4"/>
+              </a:rPr>
+              <a:t>https://drive.google.com/file/d/1OSF7pKjjQYnJCLzN58PTLGEkuhGAlHD3/view?usp=sharing</a:t>
+            </a:r>
+            <a:endParaRPr lang="en-IN" b="1" dirty="0"/>
+          </a:p>
+          <a:p>
+            <a:endParaRPr lang="en-IN" dirty="0"/>
+          </a:p>
+        </p:txBody>
+      </p:sp>
     </p:spTree>
   </p:cSld>
   <p:clrMapOvr>

</xml_diff>